<commit_message>
minor fies to presentation
</commit_message>
<xml_diff>
--- a/HPL-2_3-presentation.pptx
+++ b/HPL-2_3-presentation.pptx
@@ -123,7 +123,7 @@
 <file path=ppt/revisionInfo.xml><?xml version="1.0" encoding="utf-8"?>
 <p1510:revInfo xmlns:a="http://schemas.openxmlformats.org/drawingml/2006/main" xmlns:r="http://schemas.openxmlformats.org/officeDocument/2006/relationships" xmlns:p1510="http://schemas.microsoft.com/office/powerpoint/2015/10/main">
   <p1510:revLst>
-    <p1510:client id="{E74479A1-5103-485B-A558-BD7CD70B54FF}" v="72" dt="2025-10-30T20:52:35.906"/>
+    <p1510:client id="{E74479A1-5103-485B-A558-BD7CD70B54FF}" v="73" dt="2025-10-30T20:56:59.820"/>
   </p1510:revLst>
 </p1510:revInfo>
 </file>
@@ -133,12 +133,12 @@
   <pc:docChgLst>
     <pc:chgData name="Arthur Baverstock" userId="23c6f2f832f1bd8b" providerId="LiveId" clId="{BE527FA6-06A1-4CD3-8AD2-9B95755D5B09}"/>
     <pc:docChg chg="undo custSel addSld modSld">
-      <pc:chgData name="Arthur Baverstock" userId="23c6f2f832f1bd8b" providerId="LiveId" clId="{BE527FA6-06A1-4CD3-8AD2-9B95755D5B09}" dt="2025-10-30T20:54:00.745" v="4937" actId="403"/>
+      <pc:chgData name="Arthur Baverstock" userId="23c6f2f832f1bd8b" providerId="LiveId" clId="{BE527FA6-06A1-4CD3-8AD2-9B95755D5B09}" dt="2025-10-30T20:57:05.307" v="5018" actId="20577"/>
       <pc:docMkLst>
         <pc:docMk/>
       </pc:docMkLst>
       <pc:sldChg chg="addSp delSp modSp mod">
-        <pc:chgData name="Arthur Baverstock" userId="23c6f2f832f1bd8b" providerId="LiveId" clId="{BE527FA6-06A1-4CD3-8AD2-9B95755D5B09}" dt="2025-10-30T20:54:00.745" v="4937" actId="403"/>
+        <pc:chgData name="Arthur Baverstock" userId="23c6f2f832f1bd8b" providerId="LiveId" clId="{BE527FA6-06A1-4CD3-8AD2-9B95755D5B09}" dt="2025-10-30T20:57:05.307" v="5018" actId="20577"/>
         <pc:sldMkLst>
           <pc:docMk/>
           <pc:sldMk cId="2550287776" sldId="256"/>
@@ -152,11 +152,27 @@
           </ac:spMkLst>
         </pc:spChg>
         <pc:spChg chg="add mod">
-          <ac:chgData name="Arthur Baverstock" userId="23c6f2f832f1bd8b" providerId="LiveId" clId="{BE527FA6-06A1-4CD3-8AD2-9B95755D5B09}" dt="2025-10-30T20:53:52.596" v="4933" actId="403"/>
+          <ac:chgData name="Arthur Baverstock" userId="23c6f2f832f1bd8b" providerId="LiveId" clId="{BE527FA6-06A1-4CD3-8AD2-9B95755D5B09}" dt="2025-10-30T20:57:05.307" v="5018" actId="20577"/>
           <ac:spMkLst>
             <pc:docMk/>
             <pc:sldMk cId="2550287776" sldId="256"/>
             <ac:spMk id="4" creationId="{A021C143-4E79-3B75-F89F-D90B6F4B2025}"/>
+          </ac:spMkLst>
+        </pc:spChg>
+        <pc:spChg chg="add del">
+          <ac:chgData name="Arthur Baverstock" userId="23c6f2f832f1bd8b" providerId="LiveId" clId="{BE527FA6-06A1-4CD3-8AD2-9B95755D5B09}" dt="2025-10-30T20:55:21.079" v="4939" actId="478"/>
+          <ac:spMkLst>
+            <pc:docMk/>
+            <pc:sldMk cId="2550287776" sldId="256"/>
+            <ac:spMk id="5" creationId="{792347D9-767C-DD73-AAF8-5E1580617240}"/>
+          </ac:spMkLst>
+        </pc:spChg>
+        <pc:spChg chg="add del mod">
+          <ac:chgData name="Arthur Baverstock" userId="23c6f2f832f1bd8b" providerId="LiveId" clId="{BE527FA6-06A1-4CD3-8AD2-9B95755D5B09}" dt="2025-10-30T20:56:06.267" v="4943" actId="478"/>
+          <ac:spMkLst>
+            <pc:docMk/>
+            <pc:sldMk cId="2550287776" sldId="256"/>
+            <ac:spMk id="6" creationId="{0C49CFCE-BE93-63D9-55A9-CB0998FCA21F}"/>
           </ac:spMkLst>
         </pc:spChg>
         <pc:graphicFrameChg chg="add del mod">
@@ -12175,7 +12191,7 @@
         <p:spPr>
           <a:xfrm>
             <a:off x="757083" y="2670080"/>
-            <a:ext cx="7983793" cy="2677656"/>
+            <a:ext cx="7983793" cy="3416320"/>
           </a:xfrm>
           <a:prstGeom prst="rect">
             <a:avLst/>
@@ -12214,7 +12230,15 @@
             </a:pPr>
             <a:r>
               <a:rPr lang="en-GB" sz="2400" dirty="0"/>
-              <a:t>Each slide will show the job id’s and all relevant information</a:t>
+              <a:t>Each slide will show the </a:t>
+            </a:r>
+            <a:r>
+              <a:rPr lang="en-GB" sz="2400"/>
+              <a:t>job ID’s </a:t>
+            </a:r>
+            <a:r>
+              <a:rPr lang="en-GB" sz="2400" dirty="0"/>
+              <a:t>and all relevant information</a:t>
             </a:r>
           </a:p>
           <a:p>
@@ -12225,6 +12249,15 @@
             <a:r>
               <a:rPr lang="en-GB" sz="2400" dirty="0"/>
               <a:t>Finally a graph to show how the independent variable effects the efficiency and computing time</a:t>
+            </a:r>
+          </a:p>
+          <a:p>
+            <a:br>
+              <a:rPr lang="en-GB" sz="2400" dirty="0"/>
+            </a:br>
+            <a:r>
+              <a:rPr lang="en-GB" sz="2400" dirty="0"/>
+              <a:t>All data can be found on the HPLResults spreadsheet</a:t>
             </a:r>
           </a:p>
         </p:txBody>

</xml_diff>